<commit_message>
Een paar kleine uiterlijk fixjes
</commit_message>
<xml_diff>
--- a/Presentatie/Controller_tu_layout.pptx
+++ b/Presentatie/Controller_tu_layout.pptx
@@ -5681,7 +5681,7 @@
       </p:sp>
       <p:pic>
         <p:nvPicPr>
-          <p:cNvPr id="4099" name="Content Placeholder 1"/>
+          <p:cNvPr id="4099" name="Content Placeholder 1" descr="controller.png"/>
           <p:cNvPicPr>
             <a:picLocks noGrp="1" noChangeAspect="1"/>
           </p:cNvPicPr>
@@ -5697,15 +5697,15 @@
               </a:ext>
             </a:extLst>
           </a:blip>
-          <a:srcRect l="-3509" t="-1691" r="3509" b="38468"/>
+          <a:srcRect t="-55" b="41775"/>
           <a:stretch>
             <a:fillRect/>
           </a:stretch>
         </p:blipFill>
         <p:spPr>
           <a:xfrm>
-            <a:off x="2117344" y="1967538"/>
-            <a:ext cx="4175736" cy="3734882"/>
+            <a:off x="2541588" y="2041525"/>
+            <a:ext cx="4173623" cy="3441217"/>
           </a:xfrm>
         </p:spPr>
       </p:pic>
@@ -5996,51 +5996,24 @@
           <a:bodyPr/>
           <a:lstStyle/>
           <a:p>
-            <a:pPr marL="0" indent="0">
-              <a:buNone/>
-            </a:pPr>
             <a:r>
               <a:rPr lang="nl-NL" altLang="nl-NL">
                 <a:ea typeface="Tahoma"/>
                 <a:cs typeface="Tahoma"/>
               </a:rPr>
-              <a:t>- Ingedrukt houden van knoppen</a:t>
-            </a:r>
-          </a:p>
-          <a:p>
-            <a:pPr marL="0" indent="0">
-              <a:buNone/>
-            </a:pPr>
-            <a:endParaRPr lang="nl-NL" altLang="nl-NL">
-              <a:ea typeface="Tahoma"/>
-              <a:cs typeface="Tahoma"/>
-            </a:endParaRPr>
-          </a:p>
-          <a:p>
-            <a:pPr marL="0" indent="0">
-              <a:buNone/>
-            </a:pPr>
+              <a:t> Ingedrukt houden van knoppen</a:t>
+            </a:r>
+          </a:p>
+          <a:p>
             <a:r>
               <a:rPr lang="nl-NL" altLang="nl-NL">
                 <a:ea typeface="Tahoma"/>
                 <a:cs typeface="Tahoma"/>
               </a:rPr>
-              <a:t>- Meerdere knoppen tegelijk indrukken</a:t>
-            </a:r>
-          </a:p>
-          <a:p>
-            <a:pPr marL="0" indent="0">
-              <a:buNone/>
-            </a:pPr>
-            <a:endParaRPr lang="en-GB" altLang="nl-NL">
-              <a:ea typeface="Tahoma"/>
-              <a:cs typeface="Tahoma"/>
-            </a:endParaRPr>
-          </a:p>
-          <a:p>
-            <a:pPr marL="0" indent="0">
-              <a:buNone/>
-            </a:pPr>
+              <a:t> Meerdere knoppen tegelijk indrukken</a:t>
+            </a:r>
+          </a:p>
+          <a:p>
             <a:r>
               <a:rPr lang="nl-NL" altLang="nl-NL">
                 <a:solidFill>
@@ -6050,7 +6023,7 @@
                 <a:ea typeface="Tahoma"/>
                 <a:cs typeface="Tahoma"/>
               </a:rPr>
-              <a:t>- Rekening houden met imperfecties van input</a:t>
+              <a:t> Rekening houden met imperfecties van input</a:t>
             </a:r>
           </a:p>
         </p:txBody>

</xml_diff>